<commit_message>
fixed typs in powerpoint
</commit_message>
<xml_diff>
--- a/mod_4_presentation.pptx
+++ b/mod_4_presentation.pptx
@@ -905,7 +905,7 @@
 <dgm:dataModel xmlns:dgm="http://schemas.openxmlformats.org/drawingml/2006/diagram" xmlns:a="http://schemas.openxmlformats.org/drawingml/2006/main">
   <dgm:ptLst>
     <dgm:pt modelId="{3F56DA1F-5BB9-4BB3-A1B5-C40305F879A3}" type="doc">
-      <dgm:prSet loTypeId="urn:microsoft.com/office/officeart/2016/7/layout/LinearBlockProcessNumbered" loCatId="process" qsTypeId="urn:microsoft.com/office/officeart/2005/8/quickstyle/simple1" qsCatId="simple" csTypeId="urn:microsoft.com/office/officeart/2005/8/colors/colorful2" csCatId="colorful"/>
+      <dgm:prSet loTypeId="urn:microsoft.com/office/officeart/2016/7/layout/LinearBlockProcessNumbered" loCatId="process" qsTypeId="urn:microsoft.com/office/officeart/2005/8/quickstyle/simple1" qsCatId="simple" csTypeId="urn:microsoft.com/office/officeart/2005/8/colors/colorful2" csCatId="colorful" phldr="1"/>
       <dgm:spPr/>
       <dgm:t>
         <a:bodyPr/>
@@ -951,42 +951,6 @@
             <a:rPr lang="en-US"/>
             <a:t>01</a:t>
           </a:r>
-        </a:p>
-      </dgm:t>
-    </dgm:pt>
-    <dgm:pt modelId="{0C9D5572-E28D-4A43-9080-90EB280E679C}">
-      <dgm:prSet/>
-      <dgm:spPr/>
-      <dgm:t>
-        <a:bodyPr/>
-        <a:lstStyle/>
-        <a:p>
-          <a:r>
-            <a:rPr lang="en-US"/>
-            <a:t>Looking</a:t>
-          </a:r>
-        </a:p>
-      </dgm:t>
-    </dgm:pt>
-    <dgm:pt modelId="{46949445-56C9-49AB-A893-B89C198A7925}" type="parTrans" cxnId="{15367E54-1E47-47A5-842D-0A78118403A0}">
-      <dgm:prSet/>
-      <dgm:spPr/>
-      <dgm:t>
-        <a:bodyPr/>
-        <a:lstStyle/>
-        <a:p>
-          <a:endParaRPr lang="en-US"/>
-        </a:p>
-      </dgm:t>
-    </dgm:pt>
-    <dgm:pt modelId="{9184E911-1B5A-4B32-9555-50A8660A4703}" type="sibTrans" cxnId="{15367E54-1E47-47A5-842D-0A78118403A0}">
-      <dgm:prSet/>
-      <dgm:spPr/>
-      <dgm:t>
-        <a:bodyPr/>
-        <a:lstStyle/>
-        <a:p>
-          <a:endParaRPr lang="en-US"/>
         </a:p>
       </dgm:t>
     </dgm:pt>
@@ -1288,11 +1252,9 @@
     <dgm:cxn modelId="{87B0DE2F-1CBA-4FAF-80C0-8B3A7026E2E5}" srcId="{32E92937-2998-4039-ACC5-13512001C38D}" destId="{940D485A-67F3-4629-9263-6F639827D82F}" srcOrd="0" destOrd="0" parTransId="{3F09A8CF-8BC0-4D6D-A4DA-8275E9878ED5}" sibTransId="{50EA4453-85B0-4091-BD65-E5C15412BD7B}"/>
     <dgm:cxn modelId="{BB188849-958B-AE44-B60B-688EF15089A7}" type="presOf" srcId="{86EEC76F-3483-4DAF-8392-A45A454A4B9D}" destId="{26DA6262-BF13-9E42-9DCA-93D9009E9225}" srcOrd="0" destOrd="0" presId="urn:microsoft.com/office/officeart/2016/7/layout/LinearBlockProcessNumbered"/>
     <dgm:cxn modelId="{38F85F4A-0AD2-4D43-B4FB-268BC9FB6AEC}" srcId="{3F56DA1F-5BB9-4BB3-A1B5-C40305F879A3}" destId="{32E92937-2998-4039-ACC5-13512001C38D}" srcOrd="3" destOrd="0" parTransId="{6BF524FA-CD1F-4A68-9B58-9B94A0A7E12B}" sibTransId="{02062811-D43C-4D61-8BE3-E97311CAD7DE}"/>
-    <dgm:cxn modelId="{15367E54-1E47-47A5-842D-0A78118403A0}" srcId="{E5327B87-8598-4FDE-A621-E072EADA3873}" destId="{0C9D5572-E28D-4A43-9080-90EB280E679C}" srcOrd="0" destOrd="0" parTransId="{46949445-56C9-49AB-A893-B89C198A7925}" sibTransId="{9184E911-1B5A-4B32-9555-50A8660A4703}"/>
     <dgm:cxn modelId="{50BF986C-AF7D-314A-A826-FA878DE509F9}" type="presOf" srcId="{818C6E9B-EBFE-43F9-B340-130776A69343}" destId="{9CB8085B-FD4A-3940-8664-5E823CDF20A3}" srcOrd="0" destOrd="0" presId="urn:microsoft.com/office/officeart/2016/7/layout/LinearBlockProcessNumbered"/>
     <dgm:cxn modelId="{8C912772-BB58-B644-9733-ED0A39A8CDE3}" type="presOf" srcId="{818C6E9B-EBFE-43F9-B340-130776A69343}" destId="{562BA8E1-23C1-A947-885E-81E4CEBA1901}" srcOrd="1" destOrd="0" presId="urn:microsoft.com/office/officeart/2016/7/layout/LinearBlockProcessNumbered"/>
     <dgm:cxn modelId="{4ECE1E80-1AA7-489D-A3C4-B1E3432EA3F6}" srcId="{3F56DA1F-5BB9-4BB3-A1B5-C40305F879A3}" destId="{818C6E9B-EBFE-43F9-B340-130776A69343}" srcOrd="1" destOrd="0" parTransId="{665AB88E-02AA-4A91-8CF0-23E52C057699}" sibTransId="{86EEC76F-3483-4DAF-8392-A45A454A4B9D}"/>
-    <dgm:cxn modelId="{04AED68B-AFB7-D648-B9C0-FE5BD6D15EAA}" type="presOf" srcId="{0C9D5572-E28D-4A43-9080-90EB280E679C}" destId="{3B72F33F-EB7C-5A44-87E0-4AEE2ABC02C4}" srcOrd="0" destOrd="1" presId="urn:microsoft.com/office/officeart/2016/7/layout/LinearBlockProcessNumbered"/>
     <dgm:cxn modelId="{8CAB478F-26E0-854B-AC1B-5BD4165F6AF9}" type="presOf" srcId="{32E92937-2998-4039-ACC5-13512001C38D}" destId="{78EB2C47-E8E8-534E-A28E-4F0E88568CA7}" srcOrd="1" destOrd="0" presId="urn:microsoft.com/office/officeart/2016/7/layout/LinearBlockProcessNumbered"/>
     <dgm:cxn modelId="{9C28A1A4-FF5B-1244-8F82-9E845156C5AE}" type="presOf" srcId="{02062811-D43C-4D61-8BE3-E97311CAD7DE}" destId="{1A42949C-FFD5-7E4E-9E42-A91EDC6E736B}" srcOrd="0" destOrd="0" presId="urn:microsoft.com/office/officeart/2016/7/layout/LinearBlockProcessNumbered"/>
     <dgm:cxn modelId="{ED1B2CA8-BFAD-45D3-948F-2D35738465C5}" srcId="{3F56DA1F-5BB9-4BB3-A1B5-C40305F879A3}" destId="{8E9CA18F-CFE1-426F-82BD-3EFAA72BCCBF}" srcOrd="2" destOrd="0" parTransId="{E224C8EA-F188-419F-BA7C-96A87316EFCF}" sibTransId="{56ED66BE-5279-46B4-967B-F9193EDE99F8}"/>
@@ -1411,24 +1373,6 @@
           <a:r>
             <a:rPr lang="en-US" sz="1700" kern="1200"/>
             <a:t>Develop a program that can automatically grab tweets for analysis</a:t>
-          </a:r>
-        </a:p>
-        <a:p>
-          <a:pPr marL="114300" lvl="1" indent="-114300" algn="l" defTabSz="577850">
-            <a:lnSpc>
-              <a:spcPct val="90000"/>
-            </a:lnSpc>
-            <a:spcBef>
-              <a:spcPct val="0"/>
-            </a:spcBef>
-            <a:spcAft>
-              <a:spcPct val="15000"/>
-            </a:spcAft>
-            <a:buChar char="•"/>
-          </a:pPr>
-          <a:r>
-            <a:rPr lang="en-US" sz="1300" kern="1200"/>
-            <a:t>Looking</a:t>
           </a:r>
         </a:p>
       </dsp:txBody>
@@ -18188,7 +18132,7 @@
             </a:pPr>
             <a:r>
               <a:rPr lang="en-US" sz="2800" dirty="0"/>
-              <a:t>Out of  all negative/neutral tweets, we classified 90% of them correctly</a:t>
+              <a:t>Out of  all negative/neutral tweets in our test set, we classified 90% of them correctly</a:t>
             </a:r>
           </a:p>
           <a:p>
@@ -18198,7 +18142,7 @@
             </a:pPr>
             <a:r>
               <a:rPr lang="en-US" sz="2800" dirty="0"/>
-              <a:t>Of all tweets classified as positive, 70% were actually positive</a:t>
+              <a:t>Of all tweets classified by the model as positive, 70% were actually positive</a:t>
             </a:r>
           </a:p>
           <a:p>
@@ -19086,7 +19030,7 @@
             <p:ph idx="1"/>
             <p:extLst>
               <p:ext uri="{D42A27DB-BD31-4B8C-83A1-F6EECF244321}">
-                <p14:modId xmlns:p14="http://schemas.microsoft.com/office/powerpoint/2010/main" val="1286598191"/>
+                <p14:modId xmlns:p14="http://schemas.microsoft.com/office/powerpoint/2010/main" val="2881468982"/>
               </p:ext>
             </p:extLst>
           </p:nvPr>

</xml_diff>